<commit_message>
Small update to presentation for sprint 2
</commit_message>
<xml_diff>
--- a/Documentation/Sprint2/Sprint 2 Presentation.pptx
+++ b/Documentation/Sprint2/Sprint 2 Presentation.pptx
@@ -20,23 +20,24 @@
     <p:sldId id="265" r:id="rId15"/>
     <p:sldId id="266" r:id="rId16"/>
     <p:sldId id="267" r:id="rId17"/>
+    <p:sldId id="268" r:id="rId18"/>
   </p:sldIdLst>
   <p:sldSz cy="5143500" cx="9144000"/>
   <p:notesSz cx="6858000" cy="9144000"/>
   <p:embeddedFontLst>
     <p:embeddedFont>
       <p:font typeface="Nunito"/>
-      <p:regular r:id="rId18"/>
-      <p:bold r:id="rId19"/>
-      <p:italic r:id="rId20"/>
-      <p:boldItalic r:id="rId21"/>
+      <p:regular r:id="rId19"/>
+      <p:bold r:id="rId20"/>
+      <p:italic r:id="rId21"/>
+      <p:boldItalic r:id="rId22"/>
     </p:embeddedFont>
     <p:embeddedFont>
       <p:font typeface="Montserrat"/>
-      <p:regular r:id="rId22"/>
-      <p:bold r:id="rId23"/>
-      <p:italic r:id="rId24"/>
-      <p:boldItalic r:id="rId25"/>
+      <p:regular r:id="rId23"/>
+      <p:bold r:id="rId24"/>
+      <p:italic r:id="rId25"/>
+      <p:boldItalic r:id="rId26"/>
     </p:embeddedFont>
   </p:embeddedFontLst>
   <p:defaultTextStyle>
@@ -606,7 +607,7 @@
   <p:cSld>
     <p:spTree>
       <p:nvGrpSpPr>
-        <p:cNvPr id="192" name="Shape 192"/>
+        <p:cNvPr id="193" name="Shape 193"/>
         <p:cNvGrpSpPr/>
         <p:nvPr/>
       </p:nvGrpSpPr>
@@ -620,7 +621,7 @@
       </p:grpSpPr>
       <p:sp>
         <p:nvSpPr>
-          <p:cNvPr id="193" name="Shape 193"/>
+          <p:cNvPr id="194" name="Shape 194"/>
           <p:cNvSpPr/>
           <p:nvPr>
             <p:ph idx="2" type="sldImg"/>
@@ -654,7 +655,7 @@
       </p:sp>
       <p:sp>
         <p:nvSpPr>
-          <p:cNvPr id="194" name="Shape 194"/>
+          <p:cNvPr id="195" name="Shape 195"/>
           <p:cNvSpPr txBox="1"/>
           <p:nvPr>
             <p:ph idx="1" type="body"/>
@@ -701,7 +702,7 @@
   <p:cSld>
     <p:spTree>
       <p:nvGrpSpPr>
-        <p:cNvPr id="198" name="Shape 198"/>
+        <p:cNvPr id="200" name="Shape 200"/>
         <p:cNvGrpSpPr/>
         <p:nvPr/>
       </p:nvGrpSpPr>
@@ -715,7 +716,7 @@
       </p:grpSpPr>
       <p:sp>
         <p:nvSpPr>
-          <p:cNvPr id="199" name="Shape 199"/>
+          <p:cNvPr id="201" name="Shape 201"/>
           <p:cNvSpPr/>
           <p:nvPr>
             <p:ph idx="2" type="sldImg"/>
@@ -749,7 +750,102 @@
       </p:sp>
       <p:sp>
         <p:nvSpPr>
-          <p:cNvPr id="200" name="Shape 200"/>
+          <p:cNvPr id="202" name="Shape 202"/>
+          <p:cNvSpPr txBox="1"/>
+          <p:nvPr>
+            <p:ph idx="1" type="body"/>
+          </p:nvPr>
+        </p:nvSpPr>
+        <p:spPr>
+          <a:xfrm>
+            <a:off x="685800" y="4343400"/>
+            <a:ext cx="5486400" cy="4114800"/>
+          </a:xfrm>
+          <a:prstGeom prst="rect">
+            <a:avLst/>
+          </a:prstGeom>
+        </p:spPr>
+        <p:txBody>
+          <a:bodyPr anchorCtr="0" anchor="t" bIns="91425" lIns="91425" rIns="91425" wrap="square" tIns="91425">
+            <a:noAutofit/>
+          </a:bodyPr>
+          <a:lstStyle/>
+          <a:p>
+            <a:pPr lvl="0" rtl="0">
+              <a:spcBef>
+                <a:spcPts val="0"/>
+              </a:spcBef>
+              <a:buNone/>
+            </a:pPr>
+            <a:r>
+              <a:t/>
+            </a:r>
+            <a:endParaRPr/>
+          </a:p>
+        </p:txBody>
+      </p:sp>
+    </p:spTree>
+  </p:cSld>
+  <p:clrMapOvr>
+    <a:masterClrMapping/>
+  </p:clrMapOvr>
+</p:notes>
+</file>
+
+<file path=ppt/notesSlides/notesSlide13.xml><?xml version="1.0" encoding="utf-8"?>
+<p:notes xmlns:a="http://schemas.openxmlformats.org/drawingml/2006/main" xmlns:r="http://schemas.openxmlformats.org/officeDocument/2006/relationships" xmlns:mc="http://schemas.openxmlformats.org/markup-compatibility/2006" xmlns:mv="urn:schemas-microsoft-com:mac:vml" xmlns:p="http://schemas.openxmlformats.org/presentationml/2006/main" xmlns:c="http://schemas.openxmlformats.org/drawingml/2006/chart" xmlns:dgm="http://schemas.openxmlformats.org/drawingml/2006/diagram" xmlns:o="urn:schemas-microsoft-com:office:office" xmlns:v="urn:schemas-microsoft-com:vml" xmlns:pvml="urn:schemas-microsoft-com:office:powerpoint" xmlns:com="http://schemas.openxmlformats.org/drawingml/2006/compatibility" xmlns:p14="http://schemas.microsoft.com/office/powerpoint/2010/main" xmlns:p15="http://schemas.microsoft.com/office/powerpoint/2012/main" showMasterPhAnim="0" showMasterSp="0">
+  <p:cSld>
+    <p:spTree>
+      <p:nvGrpSpPr>
+        <p:cNvPr id="206" name="Shape 206"/>
+        <p:cNvGrpSpPr/>
+        <p:nvPr/>
+      </p:nvGrpSpPr>
+      <p:grpSpPr>
+        <a:xfrm>
+          <a:off x="0" y="0"/>
+          <a:ext cx="0" cy="0"/>
+          <a:chOff x="0" y="0"/>
+          <a:chExt cx="0" cy="0"/>
+        </a:xfrm>
+      </p:grpSpPr>
+      <p:sp>
+        <p:nvSpPr>
+          <p:cNvPr id="207" name="Shape 207"/>
+          <p:cNvSpPr/>
+          <p:nvPr>
+            <p:ph idx="2" type="sldImg"/>
+          </p:nvPr>
+        </p:nvSpPr>
+        <p:spPr>
+          <a:xfrm>
+            <a:off x="381300" y="685800"/>
+            <a:ext cx="6096000" cy="3429000"/>
+          </a:xfrm>
+          <a:custGeom>
+            <a:pathLst>
+              <a:path extrusionOk="0" h="120000" w="120000">
+                <a:moveTo>
+                  <a:pt x="0" y="0"/>
+                </a:moveTo>
+                <a:lnTo>
+                  <a:pt x="120000" y="0"/>
+                </a:lnTo>
+                <a:lnTo>
+                  <a:pt x="120000" y="120000"/>
+                </a:lnTo>
+                <a:lnTo>
+                  <a:pt x="0" y="120000"/>
+                </a:lnTo>
+                <a:close/>
+              </a:path>
+            </a:pathLst>
+          </a:custGeom>
+        </p:spPr>
+      </p:sp>
+      <p:sp>
+        <p:nvSpPr>
+          <p:cNvPr id="208" name="Shape 208"/>
           <p:cNvSpPr txBox="1"/>
           <p:nvPr>
             <p:ph idx="1" type="body"/>
@@ -7994,7 +8090,7 @@
             <a:tbl>
               <a:tblPr>
                 <a:noFill/>
-                <a:tableStyleId>{F9B82F30-EC63-445C-A61B-D86D805F24FF}</a:tableStyleId>
+                <a:tableStyleId>{F39E9DC6-5562-4315-AB14-CF70F5C22B0F}</a:tableStyleId>
               </a:tblPr>
               <a:tblGrid>
                 <a:gridCol w="2008050"/>
@@ -8192,9 +8288,9 @@
                         <a:buNone/>
                       </a:pPr>
                       <a:r>
-                        <a:t/>
+                        <a:rPr lang="en"/>
+                        <a:t>9-10</a:t>
                       </a:r>
-                      <a:endParaRPr/>
                     </a:p>
                   </a:txBody>
                   <a:tcPr marT="91425" marB="91425" marR="91425" marL="91425">
@@ -8368,9 +8464,9 @@
                         <a:buNone/>
                       </a:pPr>
                       <a:r>
-                        <a:t/>
+                        <a:rPr lang="en"/>
+                        <a:t>6-7</a:t>
                       </a:r>
-                      <a:endParaRPr/>
                     </a:p>
                   </a:txBody>
                   <a:tcPr marT="91425" marB="91425" marR="91425" marL="91425">
@@ -8544,9 +8640,9 @@
                         <a:buNone/>
                       </a:pPr>
                       <a:r>
-                        <a:t/>
+                        <a:rPr lang="en"/>
+                        <a:t>3-4</a:t>
                       </a:r>
-                      <a:endParaRPr/>
                     </a:p>
                   </a:txBody>
                   <a:tcPr marT="91425" marB="91425" marR="91425" marL="91425">
@@ -8720,9 +8816,9 @@
                         <a:buNone/>
                       </a:pPr>
                       <a:r>
-                        <a:t/>
+                        <a:rPr lang="en"/>
+                        <a:t>5</a:t>
                       </a:r>
-                      <a:endParaRPr/>
                     </a:p>
                   </a:txBody>
                   <a:tcPr marT="91425" marB="91425" marR="91425" marL="91425">
@@ -8896,9 +8992,9 @@
                         <a:buNone/>
                       </a:pPr>
                       <a:r>
-                        <a:t/>
+                        <a:rPr lang="en"/>
+                        <a:t>8</a:t>
                       </a:r>
-                      <a:endParaRPr/>
                     </a:p>
                   </a:txBody>
                   <a:tcPr marT="91425" marB="91425" marR="91425" marL="91425">
@@ -9072,9 +9168,9 @@
                         <a:buNone/>
                       </a:pPr>
                       <a:r>
-                        <a:t/>
+                        <a:rPr lang="en"/>
+                        <a:t>11-12</a:t>
                       </a:r>
-                      <a:endParaRPr/>
                     </a:p>
                   </a:txBody>
                   <a:tcPr marT="91425" marB="91425" marR="91425" marL="91425">
@@ -9340,7 +9436,7 @@
                   <a:srgbClr val="000000"/>
                 </a:solidFill>
               </a:rPr>
-              <a:t>Profile</a:t>
+              <a:t>Edit Profile</a:t>
             </a:r>
           </a:p>
           <a:p>
@@ -9388,6 +9484,34 @@
           </a:ln>
         </p:spPr>
       </p:pic>
+      <p:pic>
+        <p:nvPicPr>
+          <p:cNvPr descr="brand-central-edit-profile.png" id="192" name="Shape 192"/>
+          <p:cNvPicPr preferRelativeResize="0"/>
+          <p:nvPr/>
+        </p:nvPicPr>
+        <p:blipFill>
+          <a:blip r:embed="rId4">
+            <a:alphaModFix/>
+          </a:blip>
+          <a:stretch>
+            <a:fillRect/>
+          </a:stretch>
+        </p:blipFill>
+        <p:spPr>
+          <a:xfrm>
+            <a:off x="2134737" y="1129225"/>
+            <a:ext cx="4829683" cy="3430700"/>
+          </a:xfrm>
+          <a:prstGeom prst="rect">
+            <a:avLst/>
+          </a:prstGeom>
+          <a:noFill/>
+          <a:ln>
+            <a:noFill/>
+          </a:ln>
+        </p:spPr>
+      </p:pic>
     </p:spTree>
   </p:cSld>
   <p:clrMapOvr>
@@ -9401,7 +9525,7 @@
   <p:cSld>
     <p:spTree>
       <p:nvGrpSpPr>
-        <p:cNvPr id="195" name="Shape 195"/>
+        <p:cNvPr id="196" name="Shape 196"/>
         <p:cNvGrpSpPr/>
         <p:nvPr/>
       </p:nvGrpSpPr>
@@ -9413,9 +9537,262 @@
           <a:chExt cx="0" cy="0"/>
         </a:xfrm>
       </p:grpSpPr>
+      <p:sp>
+        <p:nvSpPr>
+          <p:cNvPr id="197" name="Shape 197"/>
+          <p:cNvSpPr txBox="1"/>
+          <p:nvPr>
+            <p:ph type="title"/>
+          </p:nvPr>
+        </p:nvSpPr>
+        <p:spPr>
+          <a:xfrm>
+            <a:off x="819150" y="845600"/>
+            <a:ext cx="7505700" cy="954600"/>
+          </a:xfrm>
+          <a:prstGeom prst="rect">
+            <a:avLst/>
+          </a:prstGeom>
+        </p:spPr>
+        <p:txBody>
+          <a:bodyPr anchorCtr="0" anchor="t" bIns="91425" lIns="91425" rIns="91425" wrap="square" tIns="91425">
+            <a:noAutofit/>
+          </a:bodyPr>
+          <a:lstStyle/>
+          <a:p>
+            <a:pPr lvl="0" rtl="0">
+              <a:spcBef>
+                <a:spcPts val="0"/>
+              </a:spcBef>
+              <a:buNone/>
+            </a:pPr>
+            <a:r>
+              <a:rPr lang="en">
+                <a:solidFill>
+                  <a:srgbClr val="000000"/>
+                </a:solidFill>
+              </a:rPr>
+              <a:t>Sprint 3 Objectives</a:t>
+            </a:r>
+          </a:p>
+        </p:txBody>
+      </p:sp>
+      <p:sp>
+        <p:nvSpPr>
+          <p:cNvPr id="198" name="Shape 198"/>
+          <p:cNvSpPr txBox="1"/>
+          <p:nvPr>
+            <p:ph idx="1" type="body"/>
+          </p:nvPr>
+        </p:nvSpPr>
+        <p:spPr>
+          <a:xfrm>
+            <a:off x="819150" y="1990725"/>
+            <a:ext cx="7505700" cy="2448000"/>
+          </a:xfrm>
+          <a:prstGeom prst="rect">
+            <a:avLst/>
+          </a:prstGeom>
+        </p:spPr>
+        <p:txBody>
+          <a:bodyPr anchorCtr="0" anchor="t" bIns="91425" lIns="91425" rIns="91425" wrap="square" tIns="91425">
+            <a:noAutofit/>
+          </a:bodyPr>
+          <a:lstStyle/>
+          <a:p>
+            <a:pPr indent="-330200" lvl="0" marL="457200" rtl="0">
+              <a:spcBef>
+                <a:spcPts val="0"/>
+              </a:spcBef>
+              <a:spcAft>
+                <a:spcPts val="0"/>
+              </a:spcAft>
+              <a:buClr>
+                <a:srgbClr val="000000"/>
+              </a:buClr>
+              <a:buSzPct val="100000"/>
+              <a:buFont typeface="Nunito"/>
+            </a:pPr>
+            <a:r>
+              <a:rPr lang="en" sz="1600">
+                <a:solidFill>
+                  <a:srgbClr val="000000"/>
+                </a:solidFill>
+                <a:latin typeface="Nunito"/>
+                <a:ea typeface="Nunito"/>
+                <a:cs typeface="Nunito"/>
+                <a:sym typeface="Nunito"/>
+              </a:rPr>
+              <a:t>Onboarding screen</a:t>
+            </a:r>
+          </a:p>
+          <a:p>
+            <a:pPr indent="-330200" lvl="0" marL="457200" rtl="0">
+              <a:spcBef>
+                <a:spcPts val="0"/>
+              </a:spcBef>
+              <a:spcAft>
+                <a:spcPts val="0"/>
+              </a:spcAft>
+              <a:buClr>
+                <a:srgbClr val="000000"/>
+              </a:buClr>
+              <a:buSzPct val="100000"/>
+              <a:buFont typeface="Nunito"/>
+            </a:pPr>
+            <a:r>
+              <a:rPr lang="en" sz="1600">
+                <a:solidFill>
+                  <a:srgbClr val="000000"/>
+                </a:solidFill>
+                <a:latin typeface="Nunito"/>
+                <a:ea typeface="Nunito"/>
+                <a:cs typeface="Nunito"/>
+                <a:sym typeface="Nunito"/>
+              </a:rPr>
+              <a:t>Home screen</a:t>
+            </a:r>
+          </a:p>
+          <a:p>
+            <a:pPr indent="-330200" lvl="0" marL="457200" rtl="0">
+              <a:spcBef>
+                <a:spcPts val="0"/>
+              </a:spcBef>
+              <a:spcAft>
+                <a:spcPts val="0"/>
+              </a:spcAft>
+              <a:buClr>
+                <a:srgbClr val="000000"/>
+              </a:buClr>
+              <a:buSzPct val="100000"/>
+              <a:buFont typeface="Nunito"/>
+            </a:pPr>
+            <a:r>
+              <a:rPr lang="en" sz="1600">
+                <a:solidFill>
+                  <a:srgbClr val="000000"/>
+                </a:solidFill>
+                <a:latin typeface="Nunito"/>
+                <a:ea typeface="Nunito"/>
+                <a:cs typeface="Nunito"/>
+                <a:sym typeface="Nunito"/>
+              </a:rPr>
+              <a:t>Scraping for data</a:t>
+            </a:r>
+          </a:p>
+          <a:p>
+            <a:pPr indent="-330200" lvl="0" marL="457200" rtl="0">
+              <a:spcBef>
+                <a:spcPts val="0"/>
+              </a:spcBef>
+              <a:spcAft>
+                <a:spcPts val="0"/>
+              </a:spcAft>
+              <a:buClr>
+                <a:srgbClr val="000000"/>
+              </a:buClr>
+              <a:buSzPct val="100000"/>
+              <a:buFont typeface="Nunito"/>
+            </a:pPr>
+            <a:r>
+              <a:rPr lang="en" sz="1600">
+                <a:solidFill>
+                  <a:srgbClr val="000000"/>
+                </a:solidFill>
+                <a:latin typeface="Nunito"/>
+                <a:ea typeface="Nunito"/>
+                <a:cs typeface="Nunito"/>
+                <a:sym typeface="Nunito"/>
+              </a:rPr>
+              <a:t>Load product into channel</a:t>
+            </a:r>
+          </a:p>
+          <a:p>
+            <a:pPr indent="-330200" lvl="0" marL="457200" rtl="0">
+              <a:spcBef>
+                <a:spcPts val="0"/>
+              </a:spcBef>
+              <a:spcAft>
+                <a:spcPts val="0"/>
+              </a:spcAft>
+              <a:buClr>
+                <a:srgbClr val="000000"/>
+              </a:buClr>
+              <a:buSzPct val="100000"/>
+              <a:buFont typeface="Nunito"/>
+            </a:pPr>
+            <a:r>
+              <a:rPr lang="en" sz="1600">
+                <a:solidFill>
+                  <a:srgbClr val="000000"/>
+                </a:solidFill>
+                <a:latin typeface="Nunito"/>
+                <a:ea typeface="Nunito"/>
+                <a:cs typeface="Nunito"/>
+                <a:sym typeface="Nunito"/>
+              </a:rPr>
+              <a:t>Channel view/recommendation screen</a:t>
+            </a:r>
+          </a:p>
+          <a:p>
+            <a:pPr indent="-330200" lvl="0" marL="457200" rtl="0">
+              <a:spcBef>
+                <a:spcPts val="0"/>
+              </a:spcBef>
+              <a:spcAft>
+                <a:spcPts val="0"/>
+              </a:spcAft>
+              <a:buClr>
+                <a:srgbClr val="000000"/>
+              </a:buClr>
+              <a:buSzPct val="100000"/>
+              <a:buFont typeface="Nunito"/>
+            </a:pPr>
+            <a:r>
+              <a:rPr lang="en" sz="1600">
+                <a:solidFill>
+                  <a:srgbClr val="000000"/>
+                </a:solidFill>
+                <a:latin typeface="Nunito"/>
+                <a:ea typeface="Nunito"/>
+                <a:cs typeface="Nunito"/>
+                <a:sym typeface="Nunito"/>
+              </a:rPr>
+              <a:t>Recover password</a:t>
+            </a:r>
+          </a:p>
+          <a:p>
+            <a:pPr indent="-330200" lvl="0" marL="457200" rtl="0">
+              <a:spcBef>
+                <a:spcPts val="0"/>
+              </a:spcBef>
+              <a:spcAft>
+                <a:spcPts val="0"/>
+              </a:spcAft>
+              <a:buClr>
+                <a:srgbClr val="000000"/>
+              </a:buClr>
+              <a:buSzPct val="100000"/>
+              <a:buFont typeface="Nunito"/>
+            </a:pPr>
+            <a:r>
+              <a:rPr lang="en" sz="1600">
+                <a:solidFill>
+                  <a:srgbClr val="000000"/>
+                </a:solidFill>
+                <a:latin typeface="Nunito"/>
+                <a:ea typeface="Nunito"/>
+                <a:cs typeface="Nunito"/>
+                <a:sym typeface="Nunito"/>
+              </a:rPr>
+              <a:t>Research and Design for machine learning</a:t>
+            </a:r>
+          </a:p>
+        </p:txBody>
+      </p:sp>
       <p:pic>
         <p:nvPicPr>
-          <p:cNvPr id="196" name="Shape 196"/>
+          <p:cNvPr id="199" name="Shape 199"/>
           <p:cNvPicPr preferRelativeResize="0"/>
           <p:nvPr/>
         </p:nvPicPr>
@@ -9440,9 +9817,61 @@
           </a:ln>
         </p:spPr>
       </p:pic>
+    </p:spTree>
+  </p:cSld>
+  <p:clrMapOvr>
+    <a:masterClrMapping/>
+  </p:clrMapOvr>
+</p:sld>
+</file>
+
+<file path=ppt/slides/slide12.xml><?xml version="1.0" encoding="utf-8"?>
+<p:sld xmlns:a="http://schemas.openxmlformats.org/drawingml/2006/main" xmlns:r="http://schemas.openxmlformats.org/officeDocument/2006/relationships" xmlns:mc="http://schemas.openxmlformats.org/markup-compatibility/2006" xmlns:mv="urn:schemas-microsoft-com:mac:vml" xmlns:p="http://schemas.openxmlformats.org/presentationml/2006/main" xmlns:c="http://schemas.openxmlformats.org/drawingml/2006/chart" xmlns:dgm="http://schemas.openxmlformats.org/drawingml/2006/diagram" xmlns:o="urn:schemas-microsoft-com:office:office" xmlns:v="urn:schemas-microsoft-com:vml" xmlns:pvml="urn:schemas-microsoft-com:office:powerpoint" xmlns:com="http://schemas.openxmlformats.org/drawingml/2006/compatibility" xmlns:p14="http://schemas.microsoft.com/office/powerpoint/2010/main" xmlns:p15="http://schemas.microsoft.com/office/powerpoint/2012/main">
+  <p:cSld>
+    <p:spTree>
+      <p:nvGrpSpPr>
+        <p:cNvPr id="203" name="Shape 203"/>
+        <p:cNvGrpSpPr/>
+        <p:nvPr/>
+      </p:nvGrpSpPr>
+      <p:grpSpPr>
+        <a:xfrm>
+          <a:off x="0" y="0"/>
+          <a:ext cx="0" cy="0"/>
+          <a:chOff x="0" y="0"/>
+          <a:chExt cx="0" cy="0"/>
+        </a:xfrm>
+      </p:grpSpPr>
+      <p:pic>
+        <p:nvPicPr>
+          <p:cNvPr id="204" name="Shape 204"/>
+          <p:cNvPicPr preferRelativeResize="0"/>
+          <p:nvPr/>
+        </p:nvPicPr>
+        <p:blipFill rotWithShape="1">
+          <a:blip r:embed="rId3">
+            <a:alphaModFix/>
+          </a:blip>
+          <a:srcRect b="22613" l="6787" r="76095" t="12459"/>
+          <a:stretch/>
+        </p:blipFill>
+        <p:spPr>
+          <a:xfrm>
+            <a:off x="7862050" y="245575"/>
+            <a:ext cx="907674" cy="1109400"/>
+          </a:xfrm>
+          <a:prstGeom prst="rect">
+            <a:avLst/>
+          </a:prstGeom>
+          <a:noFill/>
+          <a:ln>
+            <a:noFill/>
+          </a:ln>
+        </p:spPr>
+      </p:pic>
       <p:sp>
         <p:nvSpPr>
-          <p:cNvPr id="197" name="Shape 197"/>
+          <p:cNvPr id="205" name="Shape 205"/>
           <p:cNvSpPr txBox="1"/>
           <p:nvPr>
             <p:ph type="title"/>
@@ -9488,12 +9917,12 @@
 </p:sld>
 </file>
 
-<file path=ppt/slides/slide12.xml><?xml version="1.0" encoding="utf-8"?>
+<file path=ppt/slides/slide13.xml><?xml version="1.0" encoding="utf-8"?>
 <p:sld xmlns:a="http://schemas.openxmlformats.org/drawingml/2006/main" xmlns:r="http://schemas.openxmlformats.org/officeDocument/2006/relationships" xmlns:mc="http://schemas.openxmlformats.org/markup-compatibility/2006" xmlns:mv="urn:schemas-microsoft-com:mac:vml" xmlns:p="http://schemas.openxmlformats.org/presentationml/2006/main" xmlns:c="http://schemas.openxmlformats.org/drawingml/2006/chart" xmlns:dgm="http://schemas.openxmlformats.org/drawingml/2006/diagram" xmlns:o="urn:schemas-microsoft-com:office:office" xmlns:v="urn:schemas-microsoft-com:vml" xmlns:pvml="urn:schemas-microsoft-com:office:powerpoint" xmlns:com="http://schemas.openxmlformats.org/drawingml/2006/compatibility" xmlns:p14="http://schemas.microsoft.com/office/powerpoint/2010/main" xmlns:p15="http://schemas.microsoft.com/office/powerpoint/2012/main">
   <p:cSld>
     <p:spTree>
       <p:nvGrpSpPr>
-        <p:cNvPr id="201" name="Shape 201"/>
+        <p:cNvPr id="209" name="Shape 209"/>
         <p:cNvGrpSpPr/>
         <p:nvPr/>
       </p:nvGrpSpPr>
@@ -9507,7 +9936,7 @@
       </p:grpSpPr>
       <p:pic>
         <p:nvPicPr>
-          <p:cNvPr id="202" name="Shape 202"/>
+          <p:cNvPr id="210" name="Shape 210"/>
           <p:cNvPicPr preferRelativeResize="0"/>
           <p:nvPr/>
         </p:nvPicPr>
@@ -9534,7 +9963,7 @@
       </p:pic>
       <p:sp>
         <p:nvSpPr>
-          <p:cNvPr id="203" name="Shape 203"/>
+          <p:cNvPr id="211" name="Shape 211"/>
           <p:cNvSpPr txBox="1"/>
           <p:nvPr>
             <p:ph type="title"/>

</xml_diff>